<commit_message>
updating with model comparison
</commit_message>
<xml_diff>
--- a/lectures/week_10_glms/le10_glms.pptx
+++ b/lectures/week_10_glms/le10_glms.pptx
@@ -238,7 +238,7 @@
           <a:p>
             <a:fld id="{755658C5-F96F-2B48-913E-225971413D7B}" type="datetimeFigureOut">
               <a:rPr lang="en-US" smtClean="0"/>
-              <a:t>3/22/21</a:t>
+              <a:t>3/23/21</a:t>
             </a:fld>
             <a:endParaRPr lang="en-US"/>
           </a:p>
@@ -634,7 +634,7 @@
           <a:p>
             <a:fld id="{26D9FEE1-29C5-B447-AA78-24FC37BCF137}" type="datetimeFigureOut">
               <a:rPr lang="en-US" smtClean="0"/>
-              <a:t>3/22/21</a:t>
+              <a:t>3/23/21</a:t>
             </a:fld>
             <a:endParaRPr lang="en-US"/>
           </a:p>
@@ -802,7 +802,7 @@
           <a:p>
             <a:fld id="{26D9FEE1-29C5-B447-AA78-24FC37BCF137}" type="datetimeFigureOut">
               <a:rPr lang="en-US" smtClean="0"/>
-              <a:t>3/22/21</a:t>
+              <a:t>3/23/21</a:t>
             </a:fld>
             <a:endParaRPr lang="en-US"/>
           </a:p>
@@ -980,7 +980,7 @@
           <a:p>
             <a:fld id="{26D9FEE1-29C5-B447-AA78-24FC37BCF137}" type="datetimeFigureOut">
               <a:rPr lang="en-US" smtClean="0"/>
-              <a:t>3/22/21</a:t>
+              <a:t>3/23/21</a:t>
             </a:fld>
             <a:endParaRPr lang="en-US"/>
           </a:p>
@@ -1148,7 +1148,7 @@
           <a:p>
             <a:fld id="{26D9FEE1-29C5-B447-AA78-24FC37BCF137}" type="datetimeFigureOut">
               <a:rPr lang="en-US" smtClean="0"/>
-              <a:t>3/22/21</a:t>
+              <a:t>3/23/21</a:t>
             </a:fld>
             <a:endParaRPr lang="en-US"/>
           </a:p>
@@ -1393,7 +1393,7 @@
           <a:p>
             <a:fld id="{26D9FEE1-29C5-B447-AA78-24FC37BCF137}" type="datetimeFigureOut">
               <a:rPr lang="en-US" smtClean="0"/>
-              <a:t>3/22/21</a:t>
+              <a:t>3/23/21</a:t>
             </a:fld>
             <a:endParaRPr lang="en-US"/>
           </a:p>
@@ -1622,7 +1622,7 @@
           <a:p>
             <a:fld id="{26D9FEE1-29C5-B447-AA78-24FC37BCF137}" type="datetimeFigureOut">
               <a:rPr lang="en-US" smtClean="0"/>
-              <a:t>3/22/21</a:t>
+              <a:t>3/23/21</a:t>
             </a:fld>
             <a:endParaRPr lang="en-US"/>
           </a:p>
@@ -1986,7 +1986,7 @@
           <a:p>
             <a:fld id="{26D9FEE1-29C5-B447-AA78-24FC37BCF137}" type="datetimeFigureOut">
               <a:rPr lang="en-US" smtClean="0"/>
-              <a:t>3/22/21</a:t>
+              <a:t>3/23/21</a:t>
             </a:fld>
             <a:endParaRPr lang="en-US"/>
           </a:p>
@@ -2103,7 +2103,7 @@
           <a:p>
             <a:fld id="{26D9FEE1-29C5-B447-AA78-24FC37BCF137}" type="datetimeFigureOut">
               <a:rPr lang="en-US" smtClean="0"/>
-              <a:t>3/22/21</a:t>
+              <a:t>3/23/21</a:t>
             </a:fld>
             <a:endParaRPr lang="en-US"/>
           </a:p>
@@ -2198,7 +2198,7 @@
           <a:p>
             <a:fld id="{26D9FEE1-29C5-B447-AA78-24FC37BCF137}" type="datetimeFigureOut">
               <a:rPr lang="en-US" smtClean="0"/>
-              <a:t>3/22/21</a:t>
+              <a:t>3/23/21</a:t>
             </a:fld>
             <a:endParaRPr lang="en-US"/>
           </a:p>
@@ -2473,7 +2473,7 @@
           <a:p>
             <a:fld id="{26D9FEE1-29C5-B447-AA78-24FC37BCF137}" type="datetimeFigureOut">
               <a:rPr lang="en-US" smtClean="0"/>
-              <a:t>3/22/21</a:t>
+              <a:t>3/23/21</a:t>
             </a:fld>
             <a:endParaRPr lang="en-US"/>
           </a:p>
@@ -2725,7 +2725,7 @@
           <a:p>
             <a:fld id="{26D9FEE1-29C5-B447-AA78-24FC37BCF137}" type="datetimeFigureOut">
               <a:rPr lang="en-US" smtClean="0"/>
-              <a:t>3/22/21</a:t>
+              <a:t>3/23/21</a:t>
             </a:fld>
             <a:endParaRPr lang="en-US"/>
           </a:p>
@@ -2936,7 +2936,7 @@
           <a:p>
             <a:fld id="{26D9FEE1-29C5-B447-AA78-24FC37BCF137}" type="datetimeFigureOut">
               <a:rPr lang="en-US" smtClean="0"/>
-              <a:t>3/22/21</a:t>
+              <a:t>3/23/21</a:t>
             </a:fld>
             <a:endParaRPr lang="en-US"/>
           </a:p>
@@ -6223,7 +6223,7 @@
             <a:pPr lvl="2"/>
             <a:r>
               <a:rPr lang="en-US" dirty="0"/>
-              <a:t>Possible options: zero-inflated models/hurdle models and bias-reduction models, correlated data e.g. </a:t>
+              <a:t>Possible options: zero-inflated models/hurdle models x2 and bias-reduction models, correlated data e.g. </a:t>
             </a:r>
             <a:r>
               <a:rPr lang="en-US" dirty="0" err="1"/>
@@ -6231,7 +6231,7 @@
             </a:r>
             <a:r>
               <a:rPr lang="en-US" dirty="0"/>
-              <a:t> models, autoregressive models (time series data), shiny apps, power analyses, non-linear models &amp; GAM/</a:t>
+              <a:t> models x1, autoregressive models (time series data), shiny apps x1, power analyses, non-linear models x4 &amp; GAM/</a:t>
             </a:r>
             <a:r>
               <a:rPr lang="en-US" dirty="0" err="1"/>
@@ -6437,7 +6437,9 @@
         </p:nvSpPr>
         <p:spPr/>
         <p:txBody>
-          <a:bodyPr/>
+          <a:bodyPr>
+            <a:normAutofit/>
+          </a:bodyPr>
           <a:lstStyle/>
           <a:p>
             <a:r>
@@ -6457,6 +6459,33 @@
               <a:rPr lang="en-US" dirty="0"/>
               <a:t>See code</a:t>
             </a:r>
+          </a:p>
+          <a:p>
+            <a:pPr marL="0" indent="0">
+              <a:buNone/>
+            </a:pPr>
+            <a:endParaRPr lang="en-US" dirty="0"/>
+          </a:p>
+          <a:p>
+            <a:pPr marL="0" indent="0">
+              <a:buNone/>
+            </a:pPr>
+            <a:endParaRPr lang="en-US" dirty="0"/>
+          </a:p>
+          <a:p>
+            <a:pPr marL="0" indent="0">
+              <a:buNone/>
+            </a:pPr>
+            <a:r>
+              <a:rPr lang="en-US" dirty="0"/>
+              <a:t>##STOPPED HERE##</a:t>
+            </a:r>
+          </a:p>
+          <a:p>
+            <a:pPr marL="0" indent="0">
+              <a:buNone/>
+            </a:pPr>
+            <a:endParaRPr lang="en-US" dirty="0"/>
           </a:p>
         </p:txBody>
       </p:sp>

</xml_diff>